<commit_message>
updated presentation before class
</commit_message>
<xml_diff>
--- a/class1/Class1.pptx
+++ b/class1/Class1.pptx
@@ -22280,26 +22280,33 @@
           <a:p>
             <a:r>
               <a:rPr lang="en-US" dirty="0"/>
-              <a:t>This presentation: </a:t>
+              <a:t>This presentation</a:t>
+            </a:r>
+            <a:r>
+              <a:rPr lang="en-US" dirty="0" smtClean="0"/>
+              <a:t>:</a:t>
+            </a:r>
+          </a:p>
+          <a:p>
+            <a:r>
+              <a:rPr lang="en-US" dirty="0" smtClean="0"/>
+              <a:t> </a:t>
             </a:r>
             <a:r>
               <a:rPr lang="en-US" dirty="0">
-                <a:hlinkClick r:id="rId3" action="ppaction://hlinkpres?slideindex=1&amp;slidetitle="/>
+                <a:hlinkClick r:id="rId3"/>
               </a:rPr>
-              <a:t>\\cronus\home\aarora\Public\R_and_DataScience\presentations\Datascience and </a:t>
+              <a:t>https://github.com/aarora79/DS_For_HighSchoolers-Summer-2018-/</a:t>
             </a:r>
             <a:r>
               <a:rPr lang="en-US" dirty="0" smtClean="0">
-                <a:hlinkClick r:id="rId3" action="ppaction://hlinkpres?slideindex=1&amp;slidetitle="/>
+                <a:hlinkClick r:id="rId3"/>
               </a:rPr>
-              <a:t>R.pptx</a:t>
+              <a:t>raw/master/class1/Class1.pptx</a:t>
             </a:r>
             <a:endParaRPr lang="en-US" dirty="0" smtClean="0"/>
           </a:p>
           <a:p>
-            <a:endParaRPr lang="en-US" dirty="0"/>
-          </a:p>
-          <a:p>
             <a:r>
               <a:rPr lang="en-US" dirty="0" smtClean="0"/>
               <a:t>Please </a:t>
@@ -22309,20 +22316,20 @@
               <a:t>copy </a:t>
             </a:r>
             <a:r>
-              <a:rPr lang="en-US" dirty="0">
-                <a:hlinkClick r:id="rId4" action="ppaction://hlinkfile"/>
-              </a:rPr>
-              <a:t>\\</a:t>
-            </a:r>
-            <a:r>
-              <a:rPr lang="en-US" dirty="0" smtClean="0">
-                <a:hlinkClick r:id="rId4" action="ppaction://hlinkfile"/>
-              </a:rPr>
-              <a:t>cronus\home\aarora\Public\R_and_DataScience\class1</a:t>
-            </a:r>
-            <a:r>
               <a:rPr lang="en-US" dirty="0" smtClean="0"/>
-              <a:t> to your PC in a folder where you plan to keep all the material for this class, typically c:\users\&lt;</a:t>
+              <a:t>code from the </a:t>
+            </a:r>
+            <a:r>
+              <a:rPr lang="en-US" dirty="0" err="1" smtClean="0"/>
+              <a:t>github</a:t>
+            </a:r>
+            <a:r>
+              <a:rPr lang="en-US" dirty="0" smtClean="0"/>
+              <a:t> repo (you could clone the repo) to </a:t>
+            </a:r>
+            <a:r>
+              <a:rPr lang="en-US" dirty="0" smtClean="0"/>
+              <a:t>your PC in a folder where you plan to keep all the material for this class, typically c:\users\&lt;</a:t>
             </a:r>
             <a:r>
               <a:rPr lang="en-US" dirty="0"/>
@@ -22717,36 +22724,102 @@
         </p:nvSpPr>
         <p:spPr/>
         <p:txBody>
-          <a:bodyPr/>
+          <a:bodyPr>
+            <a:normAutofit/>
+          </a:bodyPr>
           <a:lstStyle/>
           <a:p>
             <a:r>
               <a:rPr lang="en-US" b="1" dirty="0" smtClean="0"/>
-              <a:t>Class 1</a:t>
+              <a:t>Class </a:t>
+            </a:r>
+            <a:r>
+              <a:rPr lang="en-US" b="1" dirty="0" smtClean="0"/>
+              <a:t>1 &amp; 2 </a:t>
             </a:r>
             <a:r>
               <a:rPr lang="en-US" dirty="0" smtClean="0"/>
-              <a:t>: Get the basics of R. Run through a typical workflow for exploring a dataset.</a:t>
+              <a:t>: </a:t>
+            </a:r>
+            <a:r>
+              <a:rPr lang="en-US" dirty="0" smtClean="0"/>
+              <a:t>Get the basics of R. Run through a typical workflow for exploring a dataset</a:t>
+            </a:r>
+            <a:r>
+              <a:rPr lang="en-US" dirty="0" smtClean="0"/>
+              <a:t>.</a:t>
             </a:r>
           </a:p>
           <a:p>
             <a:r>
-              <a:rPr lang="en-US" b="1" dirty="0" smtClean="0"/>
-              <a:t>Class 2</a:t>
-            </a:r>
-            <a:r>
-              <a:rPr lang="en-US" dirty="0" smtClean="0"/>
-              <a:t>: Apply machine learning techniques on a dataset. Focus is on understanding the workflow as well as potential candidates for machine learning in data around. </a:t>
+              <a:rPr lang="en-US" sz="1600" dirty="0" smtClean="0"/>
+              <a:t>Setting up R Studio</a:t>
             </a:r>
           </a:p>
           <a:p>
             <a:r>
-              <a:rPr lang="en-US" b="1" dirty="0" smtClean="0"/>
-              <a:t>Class 3: </a:t>
-            </a:r>
-            <a:r>
-              <a:rPr lang="en-US" dirty="0" smtClean="0"/>
-              <a:t>Reproducible research, dashboards.</a:t>
+              <a:rPr lang="en-US" sz="1600" dirty="0" smtClean="0"/>
+              <a:t>Data </a:t>
+            </a:r>
+            <a:r>
+              <a:rPr lang="en-US" sz="1600" dirty="0"/>
+              <a:t>Types</a:t>
+            </a:r>
+          </a:p>
+          <a:p>
+            <a:r>
+              <a:rPr lang="en-US" sz="1600" dirty="0"/>
+              <a:t>Loops and Conditional Statements</a:t>
+            </a:r>
+          </a:p>
+          <a:p>
+            <a:r>
+              <a:rPr lang="en-US" sz="1600" dirty="0"/>
+              <a:t>Functions, </a:t>
+            </a:r>
+            <a:r>
+              <a:rPr lang="en-US" sz="1600" dirty="0" err="1"/>
+              <a:t>vectorized</a:t>
+            </a:r>
+            <a:r>
+              <a:rPr lang="en-US" sz="1600" dirty="0"/>
+              <a:t> version of functions</a:t>
+            </a:r>
+          </a:p>
+          <a:p>
+            <a:r>
+              <a:rPr lang="en-US" sz="1600" dirty="0"/>
+              <a:t>Functional Programming</a:t>
+            </a:r>
+          </a:p>
+          <a:p>
+            <a:r>
+              <a:rPr lang="en-US" sz="1600" dirty="0" smtClean="0"/>
+              <a:t>Commonly used Packages and tasks: </a:t>
+            </a:r>
+            <a:r>
+              <a:rPr lang="en-US" sz="1600" dirty="0" err="1" smtClean="0"/>
+              <a:t>dplyr</a:t>
+            </a:r>
+            <a:r>
+              <a:rPr lang="en-US" sz="1600" dirty="0" smtClean="0"/>
+              <a:t>, purr, ggplot2, </a:t>
+            </a:r>
+            <a:r>
+              <a:rPr lang="en-US" sz="1600" dirty="0" err="1" smtClean="0"/>
+              <a:t>lubridate</a:t>
+            </a:r>
+            <a:r>
+              <a:rPr lang="en-US" sz="1600" dirty="0" smtClean="0"/>
+              <a:t>, </a:t>
+            </a:r>
+            <a:r>
+              <a:rPr lang="en-US" sz="1600" dirty="0" err="1" smtClean="0"/>
+              <a:t>tidyr</a:t>
+            </a:r>
+            <a:r>
+              <a:rPr lang="en-US" sz="1600" dirty="0" smtClean="0"/>
+              <a:t>,</a:t>
             </a:r>
           </a:p>
           <a:p>
@@ -22765,8 +22838,8 @@
         </p:nvSpPr>
         <p:spPr>
           <a:xfrm>
-            <a:off x="1563302" y="5035639"/>
-            <a:ext cx="8641724" cy="901522"/>
+            <a:off x="2571481" y="5407838"/>
+            <a:ext cx="7293735" cy="901522"/>
           </a:xfrm>
           <a:prstGeom prst="roundRect">
             <a:avLst/>
@@ -22795,7 +22868,19 @@
             <a:pPr algn="ctr"/>
             <a:r>
               <a:rPr lang="en-US" dirty="0" smtClean="0"/>
-              <a:t>All through we will be working with data from our networks i.e. data we understand to make this all relevant.</a:t>
+              <a:t>All through we will be working with </a:t>
+            </a:r>
+            <a:r>
+              <a:rPr lang="en-US" dirty="0" smtClean="0"/>
+              <a:t>publically available data </a:t>
+            </a:r>
+            <a:r>
+              <a:rPr lang="en-US" dirty="0" smtClean="0"/>
+              <a:t>i.e</a:t>
+            </a:r>
+            <a:r>
+              <a:rPr lang="en-US" dirty="0" smtClean="0"/>
+              <a:t>. data we understand to make this all relevant.</a:t>
             </a:r>
             <a:endParaRPr lang="en-US" dirty="0"/>
           </a:p>

</xml_diff>

<commit_message>
updated ppt before class1
</commit_message>
<xml_diff>
--- a/class1/Class1.pptx
+++ b/class1/Class1.pptx
@@ -20612,7 +20612,6 @@
               <a:rPr lang="en-US" dirty="0" smtClean="0"/>
               <a:t>Summer 2018</a:t>
             </a:r>
-            <a:endParaRPr lang="en-US" dirty="0" smtClean="0"/>
           </a:p>
           <a:p>
             <a:r>
@@ -20897,16 +20896,10 @@
           </a:p>
           <a:p>
             <a:r>
-              <a:rPr lang="en-US" sz="1400" dirty="0" err="1">
-                <a:latin typeface="Calibri" panose="020F0502020204030204" pitchFamily="34" charset="0"/>
-              </a:rPr>
-              <a:t>ipgw_list</a:t>
-            </a:r>
-            <a:r>
               <a:rPr lang="en-US" sz="1400" dirty="0">
                 <a:latin typeface="Calibri" panose="020F0502020204030204" pitchFamily="34" charset="0"/>
               </a:rPr>
-              <a:t> = c("GW101IGW11V1A001", "GW101IGW11V1A002")</a:t>
+              <a:t>## Loops</a:t>
             </a:r>
           </a:p>
           <a:p>
@@ -20914,31 +20907,23 @@
               <a:rPr lang="en-US" sz="1400" dirty="0">
                 <a:latin typeface="Calibri" panose="020F0502020204030204" pitchFamily="34" charset="0"/>
               </a:rPr>
-              <a:t>for(</a:t>
-            </a:r>
-            <a:r>
-              <a:rPr lang="en-US" sz="1400" dirty="0" err="1">
-                <a:latin typeface="Calibri" panose="020F0502020204030204" pitchFamily="34" charset="0"/>
-              </a:rPr>
-              <a:t>ipgw</a:t>
-            </a:r>
+              <a:t>days = c("Mon", "Tue", "Wed", "Thu", "Fri", "Sat", "Sun")</a:t>
+            </a:r>
+          </a:p>
+          <a:p>
             <a:r>
               <a:rPr lang="en-US" sz="1400" dirty="0">
                 <a:latin typeface="Calibri" panose="020F0502020204030204" pitchFamily="34" charset="0"/>
               </a:rPr>
-              <a:t> in </a:t>
-            </a:r>
-            <a:r>
-              <a:rPr lang="en-US" sz="1400" dirty="0" err="1">
-                <a:latin typeface="Calibri" panose="020F0502020204030204" pitchFamily="34" charset="0"/>
-              </a:rPr>
-              <a:t>ipgw_list</a:t>
-            </a:r>
+              <a:t>for(day in days) {</a:t>
+            </a:r>
+          </a:p>
+          <a:p>
             <a:r>
               <a:rPr lang="en-US" sz="1400" dirty="0">
                 <a:latin typeface="Calibri" panose="020F0502020204030204" pitchFamily="34" charset="0"/>
               </a:rPr>
-              <a:t>) {</a:t>
+              <a:t>  print(day)</a:t>
             </a:r>
           </a:p>
           <a:p>
@@ -20946,30 +20931,8 @@
               <a:rPr lang="en-US" sz="1400" dirty="0">
                 <a:latin typeface="Calibri" panose="020F0502020204030204" pitchFamily="34" charset="0"/>
               </a:rPr>
-              <a:t>  print(</a:t>
-            </a:r>
-            <a:r>
-              <a:rPr lang="en-US" sz="1400" dirty="0" err="1">
-                <a:latin typeface="Calibri" panose="020F0502020204030204" pitchFamily="34" charset="0"/>
-              </a:rPr>
-              <a:t>ipgw</a:t>
-            </a:r>
-            <a:r>
-              <a:rPr lang="en-US" sz="1400" dirty="0">
-                <a:latin typeface="Calibri" panose="020F0502020204030204" pitchFamily="34" charset="0"/>
-              </a:rPr>
-              <a:t>)</a:t>
-            </a:r>
-          </a:p>
-          <a:p>
-            <a:r>
-              <a:rPr lang="en-US" sz="1400" dirty="0" smtClean="0">
-                <a:latin typeface="Calibri" panose="020F0502020204030204" pitchFamily="34" charset="0"/>
-              </a:rPr>
               <a:t>}</a:t>
             </a:r>
-          </a:p>
-          <a:p>
             <a:endParaRPr lang="en-US" sz="1400" dirty="0" smtClean="0">
               <a:latin typeface="Calibri" panose="020F0502020204030204" pitchFamily="34" charset="0"/>
             </a:endParaRPr>
@@ -20989,38 +20952,11 @@
               <a:rPr lang="en-US" sz="1400" dirty="0">
                 <a:latin typeface="Calibri" panose="020F0502020204030204" pitchFamily="34" charset="0"/>
               </a:rPr>
-              <a:t>map(</a:t>
-            </a:r>
-            <a:r>
-              <a:rPr lang="en-US" sz="1400" dirty="0" err="1">
-                <a:latin typeface="Calibri" panose="020F0502020204030204" pitchFamily="34" charset="0"/>
-              </a:rPr>
-              <a:t>ipgw_list</a:t>
-            </a:r>
-            <a:r>
-              <a:rPr lang="en-US" sz="1400" dirty="0">
-                <a:latin typeface="Calibri" panose="020F0502020204030204" pitchFamily="34" charset="0"/>
-              </a:rPr>
-              <a:t>, print</a:t>
-            </a:r>
-            <a:r>
-              <a:rPr lang="en-US" sz="1400" dirty="0" smtClean="0">
-                <a:latin typeface="Calibri" panose="020F0502020204030204" pitchFamily="34" charset="0"/>
-              </a:rPr>
-              <a:t>)   #function from the </a:t>
-            </a:r>
-            <a:r>
-              <a:rPr lang="en-US" sz="1400" dirty="0" err="1" smtClean="0">
-                <a:latin typeface="Calibri" panose="020F0502020204030204" pitchFamily="34" charset="0"/>
-              </a:rPr>
-              <a:t>purrr</a:t>
-            </a:r>
-            <a:r>
-              <a:rPr lang="en-US" sz="1400" dirty="0" smtClean="0">
-                <a:latin typeface="Calibri" panose="020F0502020204030204" pitchFamily="34" charset="0"/>
-              </a:rPr>
-              <a:t> package, general format is map (&lt;list&gt;, &lt;function to be applied to each element of the list&gt;)</a:t>
-            </a:r>
+              <a:t>map(days, print)</a:t>
+            </a:r>
+            <a:endParaRPr lang="en-US" sz="1400" dirty="0">
+              <a:latin typeface="Calibri" panose="020F0502020204030204" pitchFamily="34" charset="0"/>
+            </a:endParaRPr>
           </a:p>
           <a:p>
             <a:endParaRPr lang="en-US" sz="1400" dirty="0">
@@ -21029,30 +20965,6 @@
           </a:p>
         </p:txBody>
       </p:sp>
-      <p:pic>
-        <p:nvPicPr>
-          <p:cNvPr id="6" name="Picture 5"/>
-          <p:cNvPicPr>
-            <a:picLocks noChangeAspect="1"/>
-          </p:cNvPicPr>
-          <p:nvPr/>
-        </p:nvPicPr>
-        <p:blipFill>
-          <a:blip r:embed="rId2"/>
-          <a:stretch>
-            <a:fillRect/>
-          </a:stretch>
-        </p:blipFill>
-        <p:spPr>
-          <a:xfrm>
-            <a:off x="1130389" y="5672328"/>
-            <a:ext cx="1724025" cy="838200"/>
-          </a:xfrm>
-          <a:prstGeom prst="rect">
-            <a:avLst/>
-          </a:prstGeom>
-        </p:spPr>
-      </p:pic>
     </p:spTree>
     <p:extLst>
       <p:ext uri="{BB962C8B-B14F-4D97-AF65-F5344CB8AC3E}">
@@ -21131,7 +21043,7 @@
         </p:spPr>
         <p:txBody>
           <a:bodyPr>
-            <a:normAutofit/>
+            <a:normAutofit lnSpcReduction="10000"/>
           </a:bodyPr>
           <a:lstStyle/>
           <a:p>
@@ -21141,36 +21053,73 @@
             </a:r>
           </a:p>
           <a:p>
-            <a:r>
-              <a:rPr lang="nn-NO" sz="1400" dirty="0">
+            <a:endParaRPr lang="en-US" dirty="0"/>
+          </a:p>
+          <a:p>
+            <a:r>
+              <a:rPr lang="en-US" sz="1600" dirty="0">
                 <a:latin typeface="Calibri" panose="020F0502020204030204" pitchFamily="34" charset="0"/>
               </a:rPr>
-              <a:t>x=map(ipgw_list, print)</a:t>
+              <a:t># better to express this as</a:t>
             </a:r>
           </a:p>
           <a:p>
             <a:r>
-              <a:rPr lang="nn-NO" sz="1400" dirty="0">
+              <a:rPr lang="en-US" sz="1600" dirty="0">
                 <a:latin typeface="Calibri" panose="020F0502020204030204" pitchFamily="34" charset="0"/>
               </a:rPr>
-              <a:t>x[1]</a:t>
+              <a:t>map(days, print)</a:t>
             </a:r>
           </a:p>
           <a:p>
             <a:r>
-              <a:rPr lang="nn-NO" sz="1400" dirty="0">
+              <a:rPr lang="en-US" sz="1600" dirty="0">
                 <a:latin typeface="Calibri" panose="020F0502020204030204" pitchFamily="34" charset="0"/>
               </a:rPr>
-              <a:t>x[[1]]</a:t>
-            </a:r>
-            <a:endParaRPr lang="en-US" sz="1400" dirty="0" smtClean="0">
-              <a:latin typeface="Calibri" panose="020F0502020204030204" pitchFamily="34" charset="0"/>
-            </a:endParaRPr>
+              <a:t># simplify to get a vector</a:t>
+            </a:r>
           </a:p>
           <a:p>
-            <a:endParaRPr lang="en-US" dirty="0" smtClean="0"/>
+            <a:r>
+              <a:rPr lang="en-US" sz="1600" dirty="0">
+                <a:latin typeface="Calibri" panose="020F0502020204030204" pitchFamily="34" charset="0"/>
+              </a:rPr>
+              <a:t>x = </a:t>
+            </a:r>
+            <a:r>
+              <a:rPr lang="en-US" sz="1600" dirty="0" err="1">
+                <a:latin typeface="Calibri" panose="020F0502020204030204" pitchFamily="34" charset="0"/>
+              </a:rPr>
+              <a:t>unlist</a:t>
+            </a:r>
+            <a:r>
+              <a:rPr lang="en-US" sz="1600" dirty="0">
+                <a:latin typeface="Calibri" panose="020F0502020204030204" pitchFamily="34" charset="0"/>
+              </a:rPr>
+              <a:t>(map(days, print))</a:t>
+            </a:r>
           </a:p>
           <a:p>
+            <a:r>
+              <a:rPr lang="en-US" sz="1600" dirty="0">
+                <a:latin typeface="Calibri" panose="020F0502020204030204" pitchFamily="34" charset="0"/>
+              </a:rPr>
+              <a:t># now we can say</a:t>
+            </a:r>
+          </a:p>
+          <a:p>
+            <a:r>
+              <a:rPr lang="en-US" sz="1600" dirty="0">
+                <a:latin typeface="Calibri" panose="020F0502020204030204" pitchFamily="34" charset="0"/>
+              </a:rPr>
+              <a:t>x[1</a:t>
+            </a:r>
+            <a:r>
+              <a:rPr lang="en-US" sz="1600" dirty="0" smtClean="0">
+                <a:latin typeface="Calibri" panose="020F0502020204030204" pitchFamily="34" charset="0"/>
+              </a:rPr>
+              <a:t>]</a:t>
+            </a:r>
             <a:endParaRPr lang="en-US" dirty="0"/>
           </a:p>
           <a:p>
@@ -21213,7 +21162,7 @@
       </p:sp>
       <p:pic>
         <p:nvPicPr>
-          <p:cNvPr id="4" name="Picture 3"/>
+          <p:cNvPr id="8" name="Picture 7"/>
           <p:cNvPicPr>
             <a:picLocks noChangeAspect="1"/>
           </p:cNvPicPr>
@@ -21227,55 +21176,7 @@
         </p:blipFill>
         <p:spPr>
           <a:xfrm>
-            <a:off x="1024128" y="3816667"/>
-            <a:ext cx="1838325" cy="962025"/>
-          </a:xfrm>
-          <a:prstGeom prst="rect">
-            <a:avLst/>
-          </a:prstGeom>
-        </p:spPr>
-      </p:pic>
-      <p:pic>
-        <p:nvPicPr>
-          <p:cNvPr id="7" name="Picture 6"/>
-          <p:cNvPicPr>
-            <a:picLocks noChangeAspect="1"/>
-          </p:cNvPicPr>
-          <p:nvPr/>
-        </p:nvPicPr>
-        <p:blipFill>
-          <a:blip r:embed="rId3"/>
-          <a:stretch>
-            <a:fillRect/>
-          </a:stretch>
-        </p:blipFill>
-        <p:spPr>
-          <a:xfrm>
-            <a:off x="3805366" y="2826067"/>
-            <a:ext cx="3286125" cy="990600"/>
-          </a:xfrm>
-          <a:prstGeom prst="rect">
-            <a:avLst/>
-          </a:prstGeom>
-        </p:spPr>
-      </p:pic>
-      <p:pic>
-        <p:nvPicPr>
-          <p:cNvPr id="8" name="Picture 7"/>
-          <p:cNvPicPr>
-            <a:picLocks noChangeAspect="1"/>
-          </p:cNvPicPr>
-          <p:nvPr/>
-        </p:nvPicPr>
-        <p:blipFill>
-          <a:blip r:embed="rId4"/>
-          <a:stretch>
-            <a:fillRect/>
-          </a:stretch>
-        </p:blipFill>
-        <p:spPr>
-          <a:xfrm>
-            <a:off x="1053229" y="5715724"/>
+            <a:off x="1024128" y="6023610"/>
             <a:ext cx="3533775" cy="285750"/>
           </a:xfrm>
           <a:prstGeom prst="rect">
@@ -21291,7 +21192,7 @@
         </p:nvSpPr>
         <p:spPr>
           <a:xfrm>
-            <a:off x="6354780" y="5407838"/>
+            <a:off x="6354780" y="4280937"/>
             <a:ext cx="4965750" cy="901522"/>
           </a:xfrm>
           <a:prstGeom prst="roundRect">
@@ -21563,10 +21464,31 @@
               <a:rPr lang="en-US" dirty="0" smtClean="0"/>
               <a:t> version of the if-else statement. </a:t>
             </a:r>
+            <a:endParaRPr lang="en-US" dirty="0" smtClean="0"/>
           </a:p>
           <a:p>
             <a:r>
-              <a:rPr lang="en-US" sz="1400" dirty="0">
+              <a:rPr lang="en-US" sz="1100" dirty="0">
+                <a:latin typeface="Calibri" panose="020F0502020204030204" pitchFamily="34" charset="0"/>
+              </a:rPr>
+              <a:t># </a:t>
+            </a:r>
+            <a:r>
+              <a:rPr lang="en-US" sz="1100" dirty="0" smtClean="0">
+                <a:latin typeface="Calibri" panose="020F0502020204030204" pitchFamily="34" charset="0"/>
+              </a:rPr>
+              <a:t>conditional </a:t>
+            </a:r>
+            <a:r>
+              <a:rPr lang="en-US" sz="1100" dirty="0">
+                <a:latin typeface="Calibri" panose="020F0502020204030204" pitchFamily="34" charset="0"/>
+              </a:rPr>
+              <a:t>statements</a:t>
+            </a:r>
+          </a:p>
+          <a:p>
+            <a:r>
+              <a:rPr lang="en-US" sz="1100" dirty="0">
                 <a:latin typeface="Calibri" panose="020F0502020204030204" pitchFamily="34" charset="0"/>
               </a:rPr>
               <a:t>x = c(1,2,3,4,5)</a:t>
@@ -21574,33 +21496,26 @@
           </a:p>
           <a:p>
             <a:r>
-              <a:rPr lang="en-US" sz="1400" dirty="0" err="1">
+              <a:rPr lang="en-US" sz="1100" dirty="0" err="1">
                 <a:latin typeface="Calibri" panose="020F0502020204030204" pitchFamily="34" charset="0"/>
               </a:rPr>
               <a:t>ifelse</a:t>
             </a:r>
             <a:r>
-              <a:rPr lang="en-US" sz="1400" dirty="0">
+              <a:rPr lang="en-US" sz="1100" dirty="0">
                 <a:latin typeface="Calibri" panose="020F0502020204030204" pitchFamily="34" charset="0"/>
               </a:rPr>
-              <a:t>(x &gt; 2, T, F</a:t>
-            </a:r>
-            <a:r>
-              <a:rPr lang="en-US" sz="1400" dirty="0" smtClean="0">
-                <a:latin typeface="Calibri" panose="020F0502020204030204" pitchFamily="34" charset="0"/>
-              </a:rPr>
-              <a:t>) # iterate over the vector x and return T (for TRUE) if an element is greater than 2, return F (for FALSE) otherwise</a:t>
+              <a:t>(x &gt; 2, T, F) # iterate over the vector x and return T (for TRUE) if an element is greater than 2, return F (for FALSE) otherwise</a:t>
             </a:r>
           </a:p>
           <a:p>
-            <a:endParaRPr lang="en-US" sz="1400" dirty="0" smtClean="0">
-              <a:latin typeface="Calibri" panose="020F0502020204030204" pitchFamily="34" charset="0"/>
-            </a:endParaRPr>
-          </a:p>
-          <a:p>
             <a:r>
               <a:rPr lang="en-US" dirty="0" smtClean="0"/>
-              <a:t>We can use the TRUE/FALSE values provided by </a:t>
+              <a:t>We </a:t>
+            </a:r>
+            <a:r>
+              <a:rPr lang="en-US" dirty="0" smtClean="0"/>
+              <a:t>can use the TRUE/FALSE values provided by </a:t>
             </a:r>
             <a:r>
               <a:rPr lang="en-US" dirty="0" err="1" smtClean="0"/>
@@ -21642,54 +21557,6 @@
           </a:p>
         </p:txBody>
       </p:sp>
-      <p:pic>
-        <p:nvPicPr>
-          <p:cNvPr id="5" name="Picture 4"/>
-          <p:cNvPicPr>
-            <a:picLocks noChangeAspect="1"/>
-          </p:cNvPicPr>
-          <p:nvPr/>
-        </p:nvPicPr>
-        <p:blipFill>
-          <a:blip r:embed="rId2"/>
-          <a:stretch>
-            <a:fillRect/>
-          </a:stretch>
-        </p:blipFill>
-        <p:spPr>
-          <a:xfrm>
-            <a:off x="1024128" y="4297680"/>
-            <a:ext cx="2619375" cy="180975"/>
-          </a:xfrm>
-          <a:prstGeom prst="rect">
-            <a:avLst/>
-          </a:prstGeom>
-        </p:spPr>
-      </p:pic>
-      <p:pic>
-        <p:nvPicPr>
-          <p:cNvPr id="6" name="Picture 5"/>
-          <p:cNvPicPr>
-            <a:picLocks noChangeAspect="1"/>
-          </p:cNvPicPr>
-          <p:nvPr/>
-        </p:nvPicPr>
-        <p:blipFill>
-          <a:blip r:embed="rId3"/>
-          <a:stretch>
-            <a:fillRect/>
-          </a:stretch>
-        </p:blipFill>
-        <p:spPr>
-          <a:xfrm>
-            <a:off x="1128175" y="5746862"/>
-            <a:ext cx="714375" cy="180975"/>
-          </a:xfrm>
-          <a:prstGeom prst="rect">
-            <a:avLst/>
-          </a:prstGeom>
-        </p:spPr>
-      </p:pic>
     </p:spTree>
     <p:extLst>
       <p:ext uri="{BB962C8B-B14F-4D97-AF65-F5344CB8AC3E}">
@@ -22325,11 +22192,7 @@
             </a:r>
             <a:r>
               <a:rPr lang="en-US" dirty="0" smtClean="0"/>
-              <a:t> repo (you could clone the repo) to </a:t>
-            </a:r>
-            <a:r>
-              <a:rPr lang="en-US" dirty="0" smtClean="0"/>
-              <a:t>your PC in a folder where you plan to keep all the material for this class, typically c:\users\&lt;</a:t>
+              <a:t> repo (you could clone the repo) to your PC in a folder where you plan to keep all the material for this class, typically c:\users\&lt;</a:t>
             </a:r>
             <a:r>
               <a:rPr lang="en-US" dirty="0"/>
@@ -22731,23 +22594,11 @@
           <a:p>
             <a:r>
               <a:rPr lang="en-US" b="1" dirty="0" smtClean="0"/>
-              <a:t>Class </a:t>
-            </a:r>
-            <a:r>
-              <a:rPr lang="en-US" b="1" dirty="0" smtClean="0"/>
-              <a:t>1 &amp; 2 </a:t>
+              <a:t>Class 1 &amp; 2 </a:t>
             </a:r>
             <a:r>
               <a:rPr lang="en-US" dirty="0" smtClean="0"/>
-              <a:t>: </a:t>
-            </a:r>
-            <a:r>
-              <a:rPr lang="en-US" dirty="0" smtClean="0"/>
-              <a:t>Get the basics of R. Run through a typical workflow for exploring a dataset</a:t>
-            </a:r>
-            <a:r>
-              <a:rPr lang="en-US" dirty="0" smtClean="0"/>
-              <a:t>.</a:t>
+              <a:t>: Get the basics of R. Run through a typical workflow for exploring a dataset.</a:t>
             </a:r>
           </a:p>
           <a:p>
@@ -22868,19 +22719,7 @@
             <a:pPr algn="ctr"/>
             <a:r>
               <a:rPr lang="en-US" dirty="0" smtClean="0"/>
-              <a:t>All through we will be working with </a:t>
-            </a:r>
-            <a:r>
-              <a:rPr lang="en-US" dirty="0" smtClean="0"/>
-              <a:t>publically available data </a:t>
-            </a:r>
-            <a:r>
-              <a:rPr lang="en-US" dirty="0" smtClean="0"/>
-              <a:t>i.e</a:t>
-            </a:r>
-            <a:r>
-              <a:rPr lang="en-US" dirty="0" smtClean="0"/>
-              <a:t>. data we understand to make this all relevant.</a:t>
+              <a:t>All through we will be working with publically available data i.e. data we understand to make this all relevant.</a:t>
             </a:r>
             <a:endParaRPr lang="en-US" dirty="0"/>
           </a:p>
@@ -24360,7 +24199,7 @@
         </p:spPr>
         <p:txBody>
           <a:bodyPr>
-            <a:normAutofit lnSpcReduction="10000"/>
+            <a:normAutofit fontScale="92500" lnSpcReduction="10000"/>
           </a:bodyPr>
           <a:lstStyle/>
           <a:p>
@@ -24389,67 +24228,10 @@
           </a:p>
           <a:p>
             <a:r>
-              <a:rPr lang="en-US" sz="1200" dirty="0" err="1">
-                <a:latin typeface="Calibri" panose="020F0502020204030204" pitchFamily="34" charset="0"/>
-              </a:rPr>
-              <a:t>ipgw_types</a:t>
-            </a:r>
-            <a:r>
               <a:rPr lang="en-US" sz="1200" dirty="0">
                 <a:latin typeface="Calibri" panose="020F0502020204030204" pitchFamily="34" charset="0"/>
               </a:rPr>
-              <a:t> = factor(c("E-IPGW", "MGW", "WGW", "VPN", "N-IPGW", "T-IPGW</a:t>
-            </a:r>
-            <a:r>
-              <a:rPr lang="en-US" sz="1200" dirty="0" smtClean="0">
-                <a:latin typeface="Calibri" panose="020F0502020204030204" pitchFamily="34" charset="0"/>
-              </a:rPr>
-              <a:t>"))</a:t>
-            </a:r>
-          </a:p>
-          <a:p>
-            <a:r>
-              <a:rPr lang="en-US" sz="1200" dirty="0" smtClean="0">
-                <a:latin typeface="Calibri" panose="020F0502020204030204" pitchFamily="34" charset="0"/>
-              </a:rPr>
-              <a:t>&gt;</a:t>
-            </a:r>
-            <a:r>
-              <a:rPr lang="en-US" sz="1200" dirty="0" err="1" smtClean="0">
-                <a:latin typeface="Calibri" panose="020F0502020204030204" pitchFamily="34" charset="0"/>
-              </a:rPr>
-              <a:t>ipgw_types</a:t>
-            </a:r>
-            <a:r>
-              <a:rPr lang="en-US" sz="1200" dirty="0" smtClean="0">
-                <a:latin typeface="Calibri" panose="020F0502020204030204" pitchFamily="34" charset="0"/>
-              </a:rPr>
-              <a:t>[2]</a:t>
-            </a:r>
-          </a:p>
-          <a:p>
-            <a:r>
-              <a:rPr lang="en-US" sz="1200" dirty="0" smtClean="0">
-                <a:latin typeface="Calibri" panose="020F0502020204030204" pitchFamily="34" charset="0"/>
-              </a:rPr>
-              <a:t>[1] MGW</a:t>
-            </a:r>
-          </a:p>
-          <a:p>
-            <a:r>
-              <a:rPr lang="en-US" sz="1200" dirty="0" smtClean="0">
-                <a:latin typeface="Calibri" panose="020F0502020204030204" pitchFamily="34" charset="0"/>
-              </a:rPr>
-              <a:t>Levels: E-IPGW MGW WGW VPN N-IPGW T-IPGW</a:t>
-            </a:r>
-            <a:endParaRPr lang="en-US" sz="1200" dirty="0">
-              <a:latin typeface="Calibri" panose="020F0502020204030204" pitchFamily="34" charset="0"/>
-            </a:endParaRPr>
-          </a:p>
-          <a:p>
-            <a:r>
-              <a:rPr lang="en-US" dirty="0" smtClean="0"/>
-              <a:t>Ordinal: the assigned integer values matter</a:t>
+              <a:t># nominal</a:t>
             </a:r>
           </a:p>
           <a:p>
@@ -24457,7 +24239,7 @@
               <a:rPr lang="en-US" sz="1200" dirty="0">
                 <a:latin typeface="Calibri" panose="020F0502020204030204" pitchFamily="34" charset="0"/>
               </a:rPr>
-              <a:t>state = ordered(c(“disabled“, “enabled”))</a:t>
+              <a:t>days = factor(c("Mon", "Tue", "Wed", "Thu", "Fri", "Sat", "Sun"))</a:t>
             </a:r>
           </a:p>
           <a:p>
@@ -24465,8 +24247,36 @@
               <a:rPr lang="en-US" sz="1200" dirty="0">
                 <a:latin typeface="Calibri" panose="020F0502020204030204" pitchFamily="34" charset="0"/>
               </a:rPr>
-              <a:t>&gt;</a:t>
-            </a:r>
+              <a:t>days[2]</a:t>
+            </a:r>
+          </a:p>
+          <a:p>
+            <a:r>
+              <a:rPr lang="en-US" dirty="0" smtClean="0"/>
+              <a:t>Ordinal</a:t>
+            </a:r>
+            <a:r>
+              <a:rPr lang="en-US" dirty="0" smtClean="0"/>
+              <a:t>: the assigned integer values matter</a:t>
+            </a:r>
+          </a:p>
+          <a:p>
+            <a:r>
+              <a:rPr lang="en-US" sz="1200" dirty="0">
+                <a:latin typeface="Calibri" panose="020F0502020204030204" pitchFamily="34" charset="0"/>
+              </a:rPr>
+              <a:t># ordinal</a:t>
+            </a:r>
+          </a:p>
+          <a:p>
+            <a:r>
+              <a:rPr lang="en-US" sz="1200" dirty="0">
+                <a:latin typeface="Calibri" panose="020F0502020204030204" pitchFamily="34" charset="0"/>
+              </a:rPr>
+              <a:t>state = ordered(c("disabled", "enabled"))</a:t>
+            </a:r>
+          </a:p>
+          <a:p>
             <a:r>
               <a:rPr lang="en-US" sz="1200" dirty="0" err="1">
                 <a:latin typeface="Calibri" panose="020F0502020204030204" pitchFamily="34" charset="0"/>
@@ -24482,16 +24292,18 @@
           </a:p>
           <a:p>
             <a:r>
-              <a:rPr lang="en-US" sz="1200" dirty="0" err="1">
-                <a:latin typeface="Calibri" panose="020F0502020204030204" pitchFamily="34" charset="0"/>
-              </a:rPr>
-              <a:t>Ord.factor</a:t>
-            </a:r>
-            <a:r>
               <a:rPr lang="en-US" sz="1200" dirty="0">
                 <a:latin typeface="Calibri" panose="020F0502020204030204" pitchFamily="34" charset="0"/>
               </a:rPr>
-              <a:t> w/ 2 levels “disabled”&lt;“enabled”: 1 2</a:t>
+              <a:t># test the order of ordinal values</a:t>
+            </a:r>
+          </a:p>
+          <a:p>
+            <a:r>
+              <a:rPr lang="en-US" sz="1200" dirty="0">
+                <a:latin typeface="Calibri" panose="020F0502020204030204" pitchFamily="34" charset="0"/>
+              </a:rPr>
+              <a:t>state[2] &gt; state[1]</a:t>
             </a:r>
           </a:p>
           <a:p>

</xml_diff>